<commit_message>
add r code for one mean z-test using R
</commit_message>
<xml_diff>
--- a/Lecture 4 - Measure of Dispersion & Normal Curve/Lecture 4 - Measure of Dispersion & Normal Curve.pptx
+++ b/Lecture 4 - Measure of Dispersion & Normal Curve/Lecture 4 - Measure of Dispersion & Normal Curve.pptx
@@ -6983,7 +6983,7 @@
           <a:graphicData uri="http://schemas.openxmlformats.org/presentationml/2006/ole">
             <mc:AlternateContent xmlns:mc="http://schemas.openxmlformats.org/markup-compatibility/2006">
               <mc:Choice xmlns:v="urn:schemas-microsoft-com:vml" Requires="v">
-                <p:oleObj spid="_x0000_s21072" name="Equation" r:id="rId4" imgW="177569" imgH="202936" progId="Equation.3">
+                <p:oleObj spid="_x0000_s21076" name="Equation" r:id="rId4" imgW="177569" imgH="202936" progId="Equation.3">
                   <p:embed/>
                 </p:oleObj>
               </mc:Choice>
@@ -7163,7 +7163,7 @@
           <a:graphicData uri="http://schemas.openxmlformats.org/presentationml/2006/ole">
             <mc:AlternateContent xmlns:mc="http://schemas.openxmlformats.org/markup-compatibility/2006">
               <mc:Choice xmlns:v="urn:schemas-microsoft-com:vml" Requires="v">
-                <p:oleObj spid="_x0000_s21073" name="Equation" r:id="rId6" imgW="634680" imgH="253800" progId="Equation.3">
+                <p:oleObj spid="_x0000_s21077" name="Equation" r:id="rId6" imgW="634680" imgH="253800" progId="Equation.3">
                   <p:embed/>
                 </p:oleObj>
               </mc:Choice>
@@ -7285,7 +7285,7 @@
           <a:graphicData uri="http://schemas.openxmlformats.org/presentationml/2006/ole">
             <mc:AlternateContent xmlns:mc="http://schemas.openxmlformats.org/markup-compatibility/2006">
               <mc:Choice xmlns:v="urn:schemas-microsoft-com:vml" Requires="v">
-                <p:oleObj spid="_x0000_s21074" name="Equation" r:id="rId8" imgW="1294838" imgH="266584" progId="Equation.3">
+                <p:oleObj spid="_x0000_s21078" name="Equation" r:id="rId8" imgW="1294838" imgH="266584" progId="Equation.3">
                   <p:embed/>
                 </p:oleObj>
               </mc:Choice>
@@ -7361,7 +7361,7 @@
           <a:graphicData uri="http://schemas.openxmlformats.org/presentationml/2006/ole">
             <mc:AlternateContent xmlns:mc="http://schemas.openxmlformats.org/markup-compatibility/2006">
               <mc:Choice xmlns:v="urn:schemas-microsoft-com:vml" Requires="v">
-                <p:oleObj spid="_x0000_s21075" name="Equation" r:id="rId10" imgW="583920" imgH="253800" progId="Equation.3">
+                <p:oleObj spid="_x0000_s21079" name="Equation" r:id="rId10" imgW="583920" imgH="253800" progId="Equation.3">
                   <p:embed/>
                 </p:oleObj>
               </mc:Choice>
@@ -11517,7 +11517,7 @@
           <a:graphicData uri="http://schemas.openxmlformats.org/presentationml/2006/ole">
             <mc:AlternateContent xmlns:mc="http://schemas.openxmlformats.org/markup-compatibility/2006">
               <mc:Choice xmlns:v="urn:schemas-microsoft-com:vml" Requires="v">
-                <p:oleObj spid="_x0000_s18756" name="Equation" r:id="rId4" imgW="457002" imgH="203112" progId="Equation.3">
+                <p:oleObj spid="_x0000_s18758" name="Equation" r:id="rId4" imgW="457002" imgH="203112" progId="Equation.3">
                   <p:embed/>
                 </p:oleObj>
               </mc:Choice>
@@ -11645,7 +11645,7 @@
           <a:graphicData uri="http://schemas.openxmlformats.org/presentationml/2006/ole">
             <mc:AlternateContent xmlns:mc="http://schemas.openxmlformats.org/markup-compatibility/2006">
               <mc:Choice xmlns:v="urn:schemas-microsoft-com:vml" Requires="v">
-                <p:oleObj spid="_x0000_s18757" name="Equation" r:id="rId6" imgW="457002" imgH="203112" progId="Equation.3">
+                <p:oleObj spid="_x0000_s18759" name="Equation" r:id="rId6" imgW="457002" imgH="203112" progId="Equation.3">
                   <p:embed/>
                 </p:oleObj>
               </mc:Choice>
@@ -12599,7 +12599,7 @@
           <a:graphicData uri="http://schemas.openxmlformats.org/presentationml/2006/ole">
             <mc:AlternateContent xmlns:mc="http://schemas.openxmlformats.org/markup-compatibility/2006">
               <mc:Choice xmlns:v="urn:schemas-microsoft-com:vml" Requires="v">
-                <p:oleObj spid="_x0000_s20102" name="Equation" r:id="rId4" imgW="494870" imgH="215713" progId="Equation.3">
+                <p:oleObj spid="_x0000_s20106" name="Equation" r:id="rId4" imgW="494870" imgH="215713" progId="Equation.3">
                   <p:embed/>
                 </p:oleObj>
               </mc:Choice>
@@ -12719,7 +12719,7 @@
           <a:graphicData uri="http://schemas.openxmlformats.org/presentationml/2006/ole">
             <mc:AlternateContent xmlns:mc="http://schemas.openxmlformats.org/markup-compatibility/2006">
               <mc:Choice xmlns:v="urn:schemas-microsoft-com:vml" Requires="v">
-                <p:oleObj spid="_x0000_s20103" name="Equation" r:id="rId6" imgW="1205977" imgH="266584" progId="Equation.3">
+                <p:oleObj spid="_x0000_s20107" name="Equation" r:id="rId6" imgW="1205977" imgH="266584" progId="Equation.3">
                   <p:embed/>
                 </p:oleObj>
               </mc:Choice>
@@ -12839,7 +12839,7 @@
           <a:graphicData uri="http://schemas.openxmlformats.org/presentationml/2006/ole">
             <mc:AlternateContent xmlns:mc="http://schemas.openxmlformats.org/markup-compatibility/2006">
               <mc:Choice xmlns:v="urn:schemas-microsoft-com:vml" Requires="v">
-                <p:oleObj spid="_x0000_s20104" name="Equation" r:id="rId8" imgW="2120900" imgH="444500" progId="Equation.3">
+                <p:oleObj spid="_x0000_s20108" name="Equation" r:id="rId8" imgW="2120900" imgH="444500" progId="Equation.3">
                   <p:embed/>
                 </p:oleObj>
               </mc:Choice>
@@ -13009,7 +13009,7 @@
           <a:graphicData uri="http://schemas.openxmlformats.org/presentationml/2006/ole">
             <mc:AlternateContent xmlns:mc="http://schemas.openxmlformats.org/markup-compatibility/2006">
               <mc:Choice xmlns:v="urn:schemas-microsoft-com:vml" Requires="v">
-                <p:oleObj spid="_x0000_s20105" name="Equation" r:id="rId10" imgW="2514600" imgH="482400" progId="Equation.3">
+                <p:oleObj spid="_x0000_s20109" name="Equation" r:id="rId10" imgW="2514600" imgH="482400" progId="Equation.3">
                   <p:embed/>
                 </p:oleObj>
               </mc:Choice>
@@ -13878,7 +13878,7 @@
           <a:graphicData uri="http://schemas.openxmlformats.org/presentationml/2006/ole">
             <mc:AlternateContent xmlns:mc="http://schemas.openxmlformats.org/markup-compatibility/2006">
               <mc:Choice xmlns:v="urn:schemas-microsoft-com:vml" Requires="v">
-                <p:oleObj spid="_x0000_s36956" name="Equation" r:id="rId3" imgW="812520" imgH="431640" progId="Equation.DSMT4">
+                <p:oleObj spid="_x0000_s36962" name="Equation" r:id="rId3" imgW="812520" imgH="431640" progId="Equation.DSMT4">
                   <p:embed/>
                 </p:oleObj>
               </mc:Choice>
@@ -13935,7 +13935,7 @@
           <a:graphicData uri="http://schemas.openxmlformats.org/presentationml/2006/ole">
             <mc:AlternateContent xmlns:mc="http://schemas.openxmlformats.org/markup-compatibility/2006">
               <mc:Choice xmlns:v="urn:schemas-microsoft-com:vml" Requires="v">
-                <p:oleObj spid="_x0000_s36957" name="Equation" r:id="rId5" imgW="799920" imgH="431640" progId="Equation.DSMT4">
+                <p:oleObj spid="_x0000_s36963" name="Equation" r:id="rId5" imgW="799920" imgH="431640" progId="Equation.DSMT4">
                   <p:embed/>
                 </p:oleObj>
               </mc:Choice>
@@ -13999,7 +13999,7 @@
           <a:graphicData uri="http://schemas.openxmlformats.org/presentationml/2006/ole">
             <mc:AlternateContent xmlns:mc="http://schemas.openxmlformats.org/markup-compatibility/2006">
               <mc:Choice xmlns:v="urn:schemas-microsoft-com:vml" Requires="v">
-                <p:oleObj spid="_x0000_s36958" name="Equation" r:id="rId7" imgW="1143000" imgH="609480" progId="Equation.DSMT4">
+                <p:oleObj spid="_x0000_s36964" name="Equation" r:id="rId7" imgW="1143000" imgH="609480" progId="Equation.DSMT4">
                   <p:embed/>
                 </p:oleObj>
               </mc:Choice>
@@ -14056,7 +14056,7 @@
           <a:graphicData uri="http://schemas.openxmlformats.org/presentationml/2006/ole">
             <mc:AlternateContent xmlns:mc="http://schemas.openxmlformats.org/markup-compatibility/2006">
               <mc:Choice xmlns:v="urn:schemas-microsoft-com:vml" Requires="v">
-                <p:oleObj spid="_x0000_s36959" name="Equation" r:id="rId9" imgW="1193760" imgH="660240" progId="Equation.DSMT4">
+                <p:oleObj spid="_x0000_s36965" name="Equation" r:id="rId9" imgW="1193760" imgH="660240" progId="Equation.DSMT4">
                   <p:embed/>
                 </p:oleObj>
               </mc:Choice>
@@ -14120,7 +14120,7 @@
           <a:graphicData uri="http://schemas.openxmlformats.org/presentationml/2006/ole">
             <mc:AlternateContent xmlns:mc="http://schemas.openxmlformats.org/markup-compatibility/2006">
               <mc:Choice xmlns:v="urn:schemas-microsoft-com:vml" Requires="v">
-                <p:oleObj spid="_x0000_s36960" name="Equation" r:id="rId11" imgW="1143000" imgH="609480" progId="Equation.DSMT4">
+                <p:oleObj spid="_x0000_s36966" name="Equation" r:id="rId11" imgW="1143000" imgH="609480" progId="Equation.DSMT4">
                   <p:embed/>
                 </p:oleObj>
               </mc:Choice>
@@ -14177,7 +14177,7 @@
           <a:graphicData uri="http://schemas.openxmlformats.org/presentationml/2006/ole">
             <mc:AlternateContent xmlns:mc="http://schemas.openxmlformats.org/markup-compatibility/2006">
               <mc:Choice xmlns:v="urn:schemas-microsoft-com:vml" Requires="v">
-                <p:oleObj spid="_x0000_s36961" name="Equation" r:id="rId13" imgW="1193760" imgH="660240" progId="Equation.DSMT4">
+                <p:oleObj spid="_x0000_s36967" name="Equation" r:id="rId13" imgW="1193760" imgH="660240" progId="Equation.DSMT4">
                   <p:embed/>
                 </p:oleObj>
               </mc:Choice>
@@ -14888,7 +14888,7 @@
           <a:graphicData uri="http://schemas.openxmlformats.org/presentationml/2006/ole">
             <mc:AlternateContent xmlns:mc="http://schemas.openxmlformats.org/markup-compatibility/2006">
               <mc:Choice xmlns:v="urn:schemas-microsoft-com:vml" Requires="v">
-                <p:oleObj spid="_x0000_s11428" name="Bitmap Image" r:id="rId4" imgW="2866667" imgH="2019048" progId="Paint.Picture">
+                <p:oleObj spid="_x0000_s11429" name="Bitmap Image" r:id="rId4" imgW="2866667" imgH="2019048" progId="Paint.Picture">
                   <p:embed/>
                 </p:oleObj>
               </mc:Choice>
@@ -15300,7 +15300,7 @@
           <a:graphicData uri="http://schemas.openxmlformats.org/presentationml/2006/ole">
             <mc:AlternateContent xmlns:mc="http://schemas.openxmlformats.org/markup-compatibility/2006">
               <mc:Choice xmlns:v="urn:schemas-microsoft-com:vml" Requires="v">
-                <p:oleObj spid="_x0000_s12452" name="Bitmap Image" r:id="rId4" imgW="3048426" imgH="1980952" progId="Paint.Picture">
+                <p:oleObj spid="_x0000_s12453" name="Bitmap Image" r:id="rId4" imgW="3048426" imgH="1980952" progId="Paint.Picture">
                   <p:embed/>
                 </p:oleObj>
               </mc:Choice>
@@ -15894,7 +15894,7 @@
           <a:graphicData uri="http://schemas.openxmlformats.org/presentationml/2006/ole">
             <mc:AlternateContent xmlns:mc="http://schemas.openxmlformats.org/markup-compatibility/2006">
               <mc:Choice xmlns:v="urn:schemas-microsoft-com:vml" Requires="v">
-                <p:oleObj spid="_x0000_s13476" name="Bitmap Image" r:id="rId4" imgW="3648584" imgH="2200582" progId="Paint.Picture">
+                <p:oleObj spid="_x0000_s13477" name="Bitmap Image" r:id="rId4" imgW="3648584" imgH="2200582" progId="Paint.Picture">
                   <p:embed/>
                 </p:oleObj>
               </mc:Choice>
@@ -16495,7 +16495,7 @@
           <a:graphicData uri="http://schemas.openxmlformats.org/presentationml/2006/ole">
             <mc:AlternateContent xmlns:mc="http://schemas.openxmlformats.org/markup-compatibility/2006">
               <mc:Choice xmlns:v="urn:schemas-microsoft-com:vml" Requires="v">
-                <p:oleObj spid="_x0000_s6662" name="Equation" r:id="rId3" imgW="812447" imgH="253890" progId="Equation.DSMT4">
+                <p:oleObj spid="_x0000_s6665" name="Equation" r:id="rId3" imgW="812447" imgH="253890" progId="Equation.DSMT4">
                   <p:embed/>
                 </p:oleObj>
               </mc:Choice>
@@ -16625,7 +16625,7 @@
           <a:graphicData uri="http://schemas.openxmlformats.org/presentationml/2006/ole">
             <mc:AlternateContent xmlns:mc="http://schemas.openxmlformats.org/markup-compatibility/2006">
               <mc:Choice xmlns:v="urn:schemas-microsoft-com:vml" Requires="v">
-                <p:oleObj spid="_x0000_s6663" name="Equation" r:id="rId5" imgW="1104900" imgH="254000" progId="Equation.DSMT4">
+                <p:oleObj spid="_x0000_s6666" name="Equation" r:id="rId5" imgW="1104900" imgH="254000" progId="Equation.DSMT4">
                   <p:embed/>
                 </p:oleObj>
               </mc:Choice>
@@ -16755,7 +16755,7 @@
           <a:graphicData uri="http://schemas.openxmlformats.org/presentationml/2006/ole">
             <mc:AlternateContent xmlns:mc="http://schemas.openxmlformats.org/markup-compatibility/2006">
               <mc:Choice xmlns:v="urn:schemas-microsoft-com:vml" Requires="v">
-                <p:oleObj spid="_x0000_s6664" name="Equation" r:id="rId7" imgW="1129810" imgH="253890" progId="Equation.DSMT4">
+                <p:oleObj spid="_x0000_s6667" name="Equation" r:id="rId7" imgW="1129810" imgH="253890" progId="Equation.DSMT4">
                   <p:embed/>
                 </p:oleObj>
               </mc:Choice>
@@ -18444,7 +18444,7 @@
           <a:graphicData uri="http://schemas.openxmlformats.org/presentationml/2006/ole">
             <mc:AlternateContent xmlns:mc="http://schemas.openxmlformats.org/markup-compatibility/2006">
               <mc:Choice xmlns:v="urn:schemas-microsoft-com:vml" Requires="v">
-                <p:oleObj spid="_x0000_s21628" name="Bitmap Image" r:id="rId4" imgW="4858428" imgH="2180952" progId="Paint.Picture">
+                <p:oleObj spid="_x0000_s21629" name="Bitmap Image" r:id="rId4" imgW="4858428" imgH="2180952" progId="Paint.Picture">
                   <p:embed/>
                 </p:oleObj>
               </mc:Choice>
@@ -19251,7 +19251,7 @@
           <a:graphicData uri="http://schemas.openxmlformats.org/presentationml/2006/ole">
             <mc:AlternateContent xmlns:mc="http://schemas.openxmlformats.org/markup-compatibility/2006">
               <mc:Choice xmlns:v="urn:schemas-microsoft-com:vml" Requires="v">
-                <p:oleObj spid="_x0000_s22652" name="Bitmap Image" r:id="rId4" imgW="3648584" imgH="2285714" progId="Paint.Picture">
+                <p:oleObj spid="_x0000_s22653" name="Bitmap Image" r:id="rId4" imgW="3648584" imgH="2285714" progId="Paint.Picture">
                   <p:embed/>
                 </p:oleObj>
               </mc:Choice>
@@ -20046,7 +20046,7 @@
           <a:graphicData uri="http://schemas.openxmlformats.org/presentationml/2006/ole">
             <mc:AlternateContent xmlns:mc="http://schemas.openxmlformats.org/markup-compatibility/2006">
               <mc:Choice xmlns:v="urn:schemas-microsoft-com:vml" Requires="v">
-                <p:oleObj spid="_x0000_s23676" name="Bitmap Image" r:id="rId4" imgW="4229690" imgH="2486372" progId="Paint.Picture">
+                <p:oleObj spid="_x0000_s23677" name="Bitmap Image" r:id="rId4" imgW="4229690" imgH="2486372" progId="Paint.Picture">
                   <p:embed/>
                 </p:oleObj>
               </mc:Choice>
@@ -23067,7 +23067,7 @@
           <a:graphicData uri="http://schemas.openxmlformats.org/presentationml/2006/ole">
             <mc:AlternateContent xmlns:mc="http://schemas.openxmlformats.org/markup-compatibility/2006">
               <mc:Choice xmlns:v="urn:schemas-microsoft-com:vml" Requires="v">
-                <p:oleObj spid="_x0000_s24697" name="Equation" r:id="rId4" imgW="952087" imgH="253890" progId="Equation.3">
+                <p:oleObj spid="_x0000_s24698" name="Equation" r:id="rId4" imgW="952087" imgH="253890" progId="Equation.3">
                   <p:embed/>
                 </p:oleObj>
               </mc:Choice>
@@ -25086,7 +25086,7 @@
           <a:graphicData uri="http://schemas.openxmlformats.org/presentationml/2006/ole">
             <mc:AlternateContent xmlns:mc="http://schemas.openxmlformats.org/markup-compatibility/2006">
               <mc:Choice xmlns:v="urn:schemas-microsoft-com:vml" Requires="v">
-                <p:oleObj spid="_x0000_s25840" name="Equation" r:id="rId4" imgW="139639" imgH="203112" progId="Equation.3">
+                <p:oleObj spid="_x0000_s25842" name="Equation" r:id="rId4" imgW="139639" imgH="203112" progId="Equation.3">
                   <p:embed/>
                 </p:oleObj>
               </mc:Choice>
@@ -25214,7 +25214,7 @@
           <a:graphicData uri="http://schemas.openxmlformats.org/presentationml/2006/ole">
             <mc:AlternateContent xmlns:mc="http://schemas.openxmlformats.org/markup-compatibility/2006">
               <mc:Choice xmlns:v="urn:schemas-microsoft-com:vml" Requires="v">
-                <p:oleObj spid="_x0000_s25841" name="Equation" r:id="rId6" imgW="177569" imgH="202936" progId="Equation.3">
+                <p:oleObj spid="_x0000_s25843" name="Equation" r:id="rId6" imgW="177569" imgH="202936" progId="Equation.3">
                   <p:embed/>
                 </p:oleObj>
               </mc:Choice>
@@ -26140,7 +26140,7 @@
           <a:graphicData uri="http://schemas.openxmlformats.org/presentationml/2006/ole">
             <mc:AlternateContent xmlns:mc="http://schemas.openxmlformats.org/markup-compatibility/2006">
               <mc:Choice xmlns:v="urn:schemas-microsoft-com:vml" Requires="v">
-                <p:oleObj spid="_x0000_s26864" name="Equation" r:id="rId4" imgW="748975" imgH="203112" progId="Equation.3">
+                <p:oleObj spid="_x0000_s26866" name="Equation" r:id="rId4" imgW="748975" imgH="203112" progId="Equation.3">
                   <p:embed/>
                 </p:oleObj>
               </mc:Choice>
@@ -26270,7 +26270,7 @@
           <a:graphicData uri="http://schemas.openxmlformats.org/presentationml/2006/ole">
             <mc:AlternateContent xmlns:mc="http://schemas.openxmlformats.org/markup-compatibility/2006">
               <mc:Choice xmlns:v="urn:schemas-microsoft-com:vml" Requires="v">
-                <p:oleObj spid="_x0000_s26865" name="Equation" r:id="rId6" imgW="609336" imgH="215806" progId="Equation.DSMT4">
+                <p:oleObj spid="_x0000_s26867" name="Equation" r:id="rId6" imgW="609336" imgH="215806" progId="Equation.DSMT4">
                   <p:embed/>
                 </p:oleObj>
               </mc:Choice>
@@ -27320,7 +27320,7 @@
           <a:graphicData uri="http://schemas.openxmlformats.org/presentationml/2006/ole">
             <mc:AlternateContent xmlns:mc="http://schemas.openxmlformats.org/markup-compatibility/2006">
               <mc:Choice xmlns:v="urn:schemas-microsoft-com:vml" Requires="v">
-                <p:oleObj spid="_x0000_s27769" name="Equation" r:id="rId4" imgW="1257120" imgH="444240" progId="Equation.DSMT4">
+                <p:oleObj spid="_x0000_s27770" name="Equation" r:id="rId4" imgW="1257120" imgH="444240" progId="Equation.DSMT4">
                   <p:embed/>
                 </p:oleObj>
               </mc:Choice>
@@ -28126,7 +28126,7 @@
           <a:graphicData uri="http://schemas.openxmlformats.org/presentationml/2006/ole">
             <mc:AlternateContent xmlns:mc="http://schemas.openxmlformats.org/markup-compatibility/2006">
               <mc:Choice xmlns:v="urn:schemas-microsoft-com:vml" Requires="v">
-                <p:oleObj spid="_x0000_s28912" r:id="rId4" imgW="1040948" imgH="241195" progId="Equation.3">
+                <p:oleObj spid="_x0000_s28914" r:id="rId4" imgW="1040948" imgH="241195" progId="Equation.3">
                   <p:embed/>
                 </p:oleObj>
               </mc:Choice>
@@ -28237,7 +28237,7 @@
           <a:graphicData uri="http://schemas.openxmlformats.org/presentationml/2006/ole">
             <mc:AlternateContent xmlns:mc="http://schemas.openxmlformats.org/markup-compatibility/2006">
               <mc:Choice xmlns:v="urn:schemas-microsoft-com:vml" Requires="v">
-                <p:oleObj spid="_x0000_s28913" r:id="rId6" imgW="990170" imgH="241195" progId="Equation.3">
+                <p:oleObj spid="_x0000_s28915" r:id="rId6" imgW="990170" imgH="241195" progId="Equation.3">
                   <p:embed/>
                 </p:oleObj>
               </mc:Choice>

</xml_diff>